<commit_message>
Added extra example for json.loads()
</commit_message>
<xml_diff>
--- a/Python Level 2/Lesson 4/Session 4.pptx
+++ b/Python Level 2/Lesson 4/Session 4.pptx
@@ -5,7 +5,7 @@
     <p:sldMasterId id="2147483648" r:id="rId1"/>
   </p:sldMasterIdLst>
   <p:notesMasterIdLst>
-    <p:notesMasterId r:id="rId13"/>
+    <p:notesMasterId r:id="rId14"/>
   </p:notesMasterIdLst>
   <p:sldIdLst>
     <p:sldId id="256" r:id="rId2"/>
@@ -14,11 +14,12 @@
     <p:sldId id="279" r:id="rId5"/>
     <p:sldId id="280" r:id="rId6"/>
     <p:sldId id="281" r:id="rId7"/>
-    <p:sldId id="286" r:id="rId8"/>
-    <p:sldId id="284" r:id="rId9"/>
-    <p:sldId id="283" r:id="rId10"/>
-    <p:sldId id="285" r:id="rId11"/>
-    <p:sldId id="267" r:id="rId12"/>
+    <p:sldId id="287" r:id="rId8"/>
+    <p:sldId id="286" r:id="rId9"/>
+    <p:sldId id="284" r:id="rId10"/>
+    <p:sldId id="283" r:id="rId11"/>
+    <p:sldId id="285" r:id="rId12"/>
+    <p:sldId id="267" r:id="rId13"/>
   </p:sldIdLst>
   <p:sldSz cx="12192000" cy="6858000"/>
   <p:notesSz cx="6858000" cy="9144000"/>
@@ -207,7 +208,7 @@
           <a:p>
             <a:fld id="{A1609144-CA2D-5B42-9245-4141F5EB8897}" type="datetimeFigureOut">
               <a:rPr lang="en-US" smtClean="0"/>
-              <a:t>6/13/18</a:t>
+              <a:t>10/16/18</a:t>
             </a:fld>
             <a:endParaRPr lang="en-US"/>
           </a:p>
@@ -687,7 +688,7 @@
           <a:p>
             <a:fld id="{F86DE704-5A85-4041-9FC6-7273780BCBF6}" type="datetimeFigureOut">
               <a:rPr lang="en-US" smtClean="0"/>
-              <a:t>6/13/18</a:t>
+              <a:t>10/16/18</a:t>
             </a:fld>
             <a:endParaRPr lang="en-US"/>
           </a:p>
@@ -855,7 +856,7 @@
           <a:p>
             <a:fld id="{F86DE704-5A85-4041-9FC6-7273780BCBF6}" type="datetimeFigureOut">
               <a:rPr lang="en-US" smtClean="0"/>
-              <a:t>6/13/18</a:t>
+              <a:t>10/16/18</a:t>
             </a:fld>
             <a:endParaRPr lang="en-US"/>
           </a:p>
@@ -1033,7 +1034,7 @@
           <a:p>
             <a:fld id="{F86DE704-5A85-4041-9FC6-7273780BCBF6}" type="datetimeFigureOut">
               <a:rPr lang="en-US" smtClean="0"/>
-              <a:t>6/13/18</a:t>
+              <a:t>10/16/18</a:t>
             </a:fld>
             <a:endParaRPr lang="en-US"/>
           </a:p>
@@ -1201,7 +1202,7 @@
           <a:p>
             <a:fld id="{F86DE704-5A85-4041-9FC6-7273780BCBF6}" type="datetimeFigureOut">
               <a:rPr lang="en-US" smtClean="0"/>
-              <a:t>6/13/18</a:t>
+              <a:t>10/16/18</a:t>
             </a:fld>
             <a:endParaRPr lang="en-US"/>
           </a:p>
@@ -1446,7 +1447,7 @@
           <a:p>
             <a:fld id="{F86DE704-5A85-4041-9FC6-7273780BCBF6}" type="datetimeFigureOut">
               <a:rPr lang="en-US" smtClean="0"/>
-              <a:t>6/13/18</a:t>
+              <a:t>10/16/18</a:t>
             </a:fld>
             <a:endParaRPr lang="en-US"/>
           </a:p>
@@ -1675,7 +1676,7 @@
           <a:p>
             <a:fld id="{F86DE704-5A85-4041-9FC6-7273780BCBF6}" type="datetimeFigureOut">
               <a:rPr lang="en-US" smtClean="0"/>
-              <a:t>6/13/18</a:t>
+              <a:t>10/16/18</a:t>
             </a:fld>
             <a:endParaRPr lang="en-US"/>
           </a:p>
@@ -2039,7 +2040,7 @@
           <a:p>
             <a:fld id="{F86DE704-5A85-4041-9FC6-7273780BCBF6}" type="datetimeFigureOut">
               <a:rPr lang="en-US" smtClean="0"/>
-              <a:t>6/13/18</a:t>
+              <a:t>10/16/18</a:t>
             </a:fld>
             <a:endParaRPr lang="en-US"/>
           </a:p>
@@ -2156,7 +2157,7 @@
           <a:p>
             <a:fld id="{F86DE704-5A85-4041-9FC6-7273780BCBF6}" type="datetimeFigureOut">
               <a:rPr lang="en-US" smtClean="0"/>
-              <a:t>6/13/18</a:t>
+              <a:t>10/16/18</a:t>
             </a:fld>
             <a:endParaRPr lang="en-US"/>
           </a:p>
@@ -2251,7 +2252,7 @@
           <a:p>
             <a:fld id="{F86DE704-5A85-4041-9FC6-7273780BCBF6}" type="datetimeFigureOut">
               <a:rPr lang="en-US" smtClean="0"/>
-              <a:t>6/13/18</a:t>
+              <a:t>10/16/18</a:t>
             </a:fld>
             <a:endParaRPr lang="en-US"/>
           </a:p>
@@ -2526,7 +2527,7 @@
           <a:p>
             <a:fld id="{F86DE704-5A85-4041-9FC6-7273780BCBF6}" type="datetimeFigureOut">
               <a:rPr lang="en-US" smtClean="0"/>
-              <a:t>6/13/18</a:t>
+              <a:t>10/16/18</a:t>
             </a:fld>
             <a:endParaRPr lang="en-US"/>
           </a:p>
@@ -2778,7 +2779,7 @@
           <a:p>
             <a:fld id="{F86DE704-5A85-4041-9FC6-7273780BCBF6}" type="datetimeFigureOut">
               <a:rPr lang="en-US" smtClean="0"/>
-              <a:t>6/13/18</a:t>
+              <a:t>10/16/18</a:t>
             </a:fld>
             <a:endParaRPr lang="en-US"/>
           </a:p>
@@ -2989,7 +2990,7 @@
           <a:p>
             <a:fld id="{F86DE704-5A85-4041-9FC6-7273780BCBF6}" type="datetimeFigureOut">
               <a:rPr lang="en-US" smtClean="0"/>
-              <a:t>6/13/18</a:t>
+              <a:t>10/16/18</a:t>
             </a:fld>
             <a:endParaRPr lang="en-US"/>
           </a:p>
@@ -3572,6 +3573,119 @@
           <a:bodyPr/>
           <a:lstStyle/>
           <a:p>
+            <a:pPr algn="ctr"/>
+            <a:r>
+              <a:rPr lang="en-US" dirty="0"/>
+              <a:t>Interacting with files</a:t>
+            </a:r>
+          </a:p>
+        </p:txBody>
+      </p:sp>
+      <p:pic>
+        <p:nvPicPr>
+          <p:cNvPr id="4" name="Picture 3"/>
+          <p:cNvPicPr>
+            <a:picLocks noChangeAspect="1"/>
+          </p:cNvPicPr>
+          <p:nvPr/>
+        </p:nvPicPr>
+        <p:blipFill>
+          <a:blip r:embed="rId2">
+            <a:extLst>
+              <a:ext uri="{28A0092B-C50C-407E-A947-70E740481C1C}">
+                <a14:useLocalDpi xmlns:a14="http://schemas.microsoft.com/office/drawing/2010/main" val="0"/>
+              </a:ext>
+            </a:extLst>
+          </a:blip>
+          <a:stretch>
+            <a:fillRect/>
+          </a:stretch>
+        </p:blipFill>
+        <p:spPr>
+          <a:xfrm>
+            <a:off x="1790700" y="2603500"/>
+            <a:ext cx="8610600" cy="1651000"/>
+          </a:xfrm>
+          <a:prstGeom prst="rect">
+            <a:avLst/>
+          </a:prstGeom>
+        </p:spPr>
+      </p:pic>
+      <p:pic>
+        <p:nvPicPr>
+          <p:cNvPr id="5" name="Picture 4"/>
+          <p:cNvPicPr>
+            <a:picLocks noChangeAspect="1"/>
+          </p:cNvPicPr>
+          <p:nvPr/>
+        </p:nvPicPr>
+        <p:blipFill>
+          <a:blip r:embed="rId3">
+            <a:extLst>
+              <a:ext uri="{28A0092B-C50C-407E-A947-70E740481C1C}">
+                <a14:useLocalDpi xmlns:a14="http://schemas.microsoft.com/office/drawing/2010/main" val="0"/>
+              </a:ext>
+            </a:extLst>
+          </a:blip>
+          <a:stretch>
+            <a:fillRect/>
+          </a:stretch>
+        </p:blipFill>
+        <p:spPr>
+          <a:xfrm>
+            <a:off x="9801412" y="4624575"/>
+            <a:ext cx="1552388" cy="1552388"/>
+          </a:xfrm>
+          <a:prstGeom prst="rect">
+            <a:avLst/>
+          </a:prstGeom>
+        </p:spPr>
+      </p:pic>
+    </p:spTree>
+    <p:extLst>
+      <p:ext uri="{BB962C8B-B14F-4D97-AF65-F5344CB8AC3E}">
+        <p14:creationId xmlns:p14="http://schemas.microsoft.com/office/powerpoint/2010/main" val="1261618328"/>
+      </p:ext>
+    </p:extLst>
+  </p:cSld>
+  <p:clrMapOvr>
+    <a:masterClrMapping/>
+  </p:clrMapOvr>
+</p:sld>
+</file>
+
+<file path=ppt/slides/slide11.xml><?xml version="1.0" encoding="utf-8"?>
+<p:sld xmlns:a="http://schemas.openxmlformats.org/drawingml/2006/main" xmlns:r="http://schemas.openxmlformats.org/officeDocument/2006/relationships" xmlns:p="http://schemas.openxmlformats.org/presentationml/2006/main">
+  <p:cSld>
+    <p:spTree>
+      <p:nvGrpSpPr>
+        <p:cNvPr id="1" name=""/>
+        <p:cNvGrpSpPr/>
+        <p:nvPr/>
+      </p:nvGrpSpPr>
+      <p:grpSpPr>
+        <a:xfrm>
+          <a:off x="0" y="0"/>
+          <a:ext cx="0" cy="0"/>
+          <a:chOff x="0" y="0"/>
+          <a:chExt cx="0" cy="0"/>
+        </a:xfrm>
+      </p:grpSpPr>
+      <p:sp>
+        <p:nvSpPr>
+          <p:cNvPr id="2" name="Title 1"/>
+          <p:cNvSpPr>
+            <a:spLocks noGrp="1"/>
+          </p:cNvSpPr>
+          <p:nvPr>
+            <p:ph type="title"/>
+          </p:nvPr>
+        </p:nvSpPr>
+        <p:spPr/>
+        <p:txBody>
+          <a:bodyPr/>
+          <a:lstStyle/>
+          <a:p>
             <a:r>
               <a:rPr lang="en-US" dirty="0"/>
               <a:t>Now we can save as JSON or CSV</a:t>
@@ -3651,7 +3765,7 @@
 </p:sld>
 </file>
 
-<file path=ppt/slides/slide11.xml><?xml version="1.0" encoding="utf-8"?>
+<file path=ppt/slides/slide12.xml><?xml version="1.0" encoding="utf-8"?>
 <p:sld xmlns:a="http://schemas.openxmlformats.org/drawingml/2006/main" xmlns:r="http://schemas.openxmlformats.org/officeDocument/2006/relationships" xmlns:p="http://schemas.openxmlformats.org/presentationml/2006/main">
   <p:cSld>
     <p:spTree>
@@ -3790,36 +3904,6 @@
           </a:p>
           <a:p>
             <a:endParaRPr lang="en-US" dirty="0"/>
-          </a:p>
-        </p:txBody>
-      </p:sp>
-      <p:sp>
-        <p:nvSpPr>
-          <p:cNvPr id="6" name="TextBox 5"/>
-          <p:cNvSpPr txBox="1"/>
-          <p:nvPr/>
-        </p:nvSpPr>
-        <p:spPr>
-          <a:xfrm>
-            <a:off x="790532" y="6127234"/>
-            <a:ext cx="10112649" cy="369332"/>
-          </a:xfrm>
-          <a:prstGeom prst="rect">
-            <a:avLst/>
-          </a:prstGeom>
-          <a:noFill/>
-        </p:spPr>
-        <p:txBody>
-          <a:bodyPr wrap="square" rtlCol="0">
-            <a:spAutoFit/>
-          </a:bodyPr>
-          <a:lstStyle/>
-          <a:p>
-            <a:pPr algn="ctr"/>
-            <a:r>
-              <a:rPr lang="en-US" strike="sngStrike" dirty="0"/>
-              <a:t>Questions? Comments? Come see us in S22, on Friday, 11:00 – 11:30</a:t>
-            </a:r>
           </a:p>
         </p:txBody>
       </p:sp>
@@ -4021,13 +4105,11 @@
       </p:sp>
       <p:pic>
         <p:nvPicPr>
-          <p:cNvPr id="7" name="Content Placeholder 6"/>
+          <p:cNvPr id="4" name="Picture 3"/>
           <p:cNvPicPr>
-            <a:picLocks noGrp="1" noChangeAspect="1"/>
+            <a:picLocks noChangeAspect="1"/>
           </p:cNvPicPr>
-          <p:nvPr>
-            <p:ph idx="1"/>
-          </p:nvPr>
+          <p:nvPr/>
         </p:nvPicPr>
         <p:blipFill>
           <a:blip r:embed="rId2">
@@ -4043,35 +4125,38 @@
         </p:blipFill>
         <p:spPr>
           <a:xfrm>
-            <a:off x="838200" y="2441287"/>
-            <a:ext cx="10515600" cy="2448681"/>
+            <a:off x="9801412" y="4624575"/>
+            <a:ext cx="1552388" cy="1552388"/>
           </a:xfrm>
+          <a:prstGeom prst="rect">
+            <a:avLst/>
+          </a:prstGeom>
         </p:spPr>
       </p:pic>
       <p:pic>
         <p:nvPicPr>
-          <p:cNvPr id="4" name="Picture 3"/>
+          <p:cNvPr id="8" name="Picture 7">
+            <a:extLst>
+              <a:ext uri="{FF2B5EF4-FFF2-40B4-BE49-F238E27FC236}">
+                <a16:creationId xmlns:a16="http://schemas.microsoft.com/office/drawing/2014/main" id="{F3A980CE-D0BB-B040-A9B7-93FD75612BFA}"/>
+              </a:ext>
+            </a:extLst>
+          </p:cNvPr>
           <p:cNvPicPr>
             <a:picLocks noChangeAspect="1"/>
           </p:cNvPicPr>
           <p:nvPr/>
         </p:nvPicPr>
         <p:blipFill>
-          <a:blip r:embed="rId3">
-            <a:extLst>
-              <a:ext uri="{28A0092B-C50C-407E-A947-70E740481C1C}">
-                <a14:useLocalDpi xmlns:a14="http://schemas.microsoft.com/office/drawing/2010/main" val="0"/>
-              </a:ext>
-            </a:extLst>
-          </a:blip>
+          <a:blip r:embed="rId3"/>
           <a:stretch>
             <a:fillRect/>
           </a:stretch>
         </p:blipFill>
         <p:spPr>
           <a:xfrm>
-            <a:off x="9801412" y="4624575"/>
-            <a:ext cx="1552388" cy="1552388"/>
+            <a:off x="1236345" y="1971618"/>
+            <a:ext cx="9719309" cy="2372026"/>
           </a:xfrm>
           <a:prstGeom prst="rect">
             <a:avLst/>
@@ -4354,12 +4439,21 @@
               <a:rPr lang="en-US" dirty="0">
                 <a:hlinkClick r:id="rId2"/>
               </a:rPr>
-              <a:t>http://go/enkjc8f9</a:t>
-            </a:r>
-            <a:r>
-              <a:rPr lang="en-US" dirty="0"/>
-              <a:t> </a:t>
-            </a:r>
+              <a:t>http://</a:t>
+            </a:r>
+            <a:r>
+              <a:rPr lang="en-US" dirty="0" err="1">
+                <a:hlinkClick r:id="rId2"/>
+              </a:rPr>
+              <a:t>eca</a:t>
+            </a:r>
+            <a:r>
+              <a:rPr lang="en-US" dirty="0">
+                <a:hlinkClick r:id="rId2"/>
+              </a:rPr>
+              <a:t>-python/l2session4</a:t>
+            </a:r>
+            <a:endParaRPr lang="en-US" dirty="0"/>
           </a:p>
         </p:txBody>
       </p:sp>
@@ -4448,35 +4542,6 @@
       </p:sp>
       <p:pic>
         <p:nvPicPr>
-          <p:cNvPr id="4" name="Content Placeholder 3"/>
-          <p:cNvPicPr>
-            <a:picLocks noGrp="1" noChangeAspect="1"/>
-          </p:cNvPicPr>
-          <p:nvPr>
-            <p:ph idx="1"/>
-          </p:nvPr>
-        </p:nvPicPr>
-        <p:blipFill>
-          <a:blip r:embed="rId2">
-            <a:extLst>
-              <a:ext uri="{28A0092B-C50C-407E-A947-70E740481C1C}">
-                <a14:useLocalDpi xmlns:a14="http://schemas.microsoft.com/office/drawing/2010/main" val="0"/>
-              </a:ext>
-            </a:extLst>
-          </a:blip>
-          <a:stretch>
-            <a:fillRect/>
-          </a:stretch>
-        </p:blipFill>
-        <p:spPr>
-          <a:xfrm>
-            <a:off x="2368550" y="2953544"/>
-            <a:ext cx="7454900" cy="2095500"/>
-          </a:xfrm>
-        </p:spPr>
-      </p:pic>
-      <p:pic>
-        <p:nvPicPr>
           <p:cNvPr id="6" name="Picture 5"/>
           <p:cNvPicPr>
             <a:picLocks noChangeAspect="1"/>
@@ -4484,7 +4549,7 @@
           <p:nvPr/>
         </p:nvPicPr>
         <p:blipFill>
-          <a:blip r:embed="rId3">
+          <a:blip r:embed="rId2">
             <a:extLst>
               <a:ext uri="{28A0092B-C50C-407E-A947-70E740481C1C}">
                 <a14:useLocalDpi xmlns:a14="http://schemas.microsoft.com/office/drawing/2010/main" val="0"/>
@@ -4503,6 +4568,35 @@
           <a:prstGeom prst="rect">
             <a:avLst/>
           </a:prstGeom>
+        </p:spPr>
+      </p:pic>
+      <p:pic>
+        <p:nvPicPr>
+          <p:cNvPr id="8" name="Content Placeholder 7">
+            <a:extLst>
+              <a:ext uri="{FF2B5EF4-FFF2-40B4-BE49-F238E27FC236}">
+                <a16:creationId xmlns:a16="http://schemas.microsoft.com/office/drawing/2014/main" id="{2228479B-E788-A647-BE0B-7142D90C44A5}"/>
+              </a:ext>
+            </a:extLst>
+          </p:cNvPr>
+          <p:cNvPicPr>
+            <a:picLocks noGrp="1" noChangeAspect="1"/>
+          </p:cNvPicPr>
+          <p:nvPr>
+            <p:ph idx="1"/>
+          </p:nvPr>
+        </p:nvPicPr>
+        <p:blipFill>
+          <a:blip r:embed="rId3"/>
+          <a:stretch>
+            <a:fillRect/>
+          </a:stretch>
+        </p:blipFill>
+        <p:spPr>
+          <a:xfrm>
+            <a:off x="971550" y="1690688"/>
+            <a:ext cx="10248900" cy="2578100"/>
+          </a:xfrm>
         </p:spPr>
       </p:pic>
     </p:spTree>
@@ -4537,6 +4631,130 @@
       </p:grpSpPr>
       <p:sp>
         <p:nvSpPr>
+          <p:cNvPr id="2" name="Title 1">
+            <a:extLst>
+              <a:ext uri="{FF2B5EF4-FFF2-40B4-BE49-F238E27FC236}">
+                <a16:creationId xmlns:a16="http://schemas.microsoft.com/office/drawing/2014/main" id="{21283796-58C7-5E40-9BE8-79EBD44D843B}"/>
+              </a:ext>
+            </a:extLst>
+          </p:cNvPr>
+          <p:cNvSpPr>
+            <a:spLocks noGrp="1"/>
+          </p:cNvSpPr>
+          <p:nvPr>
+            <p:ph type="title"/>
+          </p:nvPr>
+        </p:nvSpPr>
+        <p:spPr/>
+        <p:txBody>
+          <a:bodyPr/>
+          <a:lstStyle/>
+          <a:p>
+            <a:pPr algn="ctr"/>
+            <a:r>
+              <a:rPr lang="en-US" dirty="0"/>
+              <a:t>Getting to know JSON a bit better</a:t>
+            </a:r>
+          </a:p>
+        </p:txBody>
+      </p:sp>
+      <p:pic>
+        <p:nvPicPr>
+          <p:cNvPr id="6" name="Content Placeholder 5">
+            <a:extLst>
+              <a:ext uri="{FF2B5EF4-FFF2-40B4-BE49-F238E27FC236}">
+                <a16:creationId xmlns:a16="http://schemas.microsoft.com/office/drawing/2014/main" id="{023388D2-3733-904E-A3AF-9A3D4825E534}"/>
+              </a:ext>
+            </a:extLst>
+          </p:cNvPr>
+          <p:cNvPicPr>
+            <a:picLocks noGrp="1" noChangeAspect="1"/>
+          </p:cNvPicPr>
+          <p:nvPr>
+            <p:ph idx="1"/>
+          </p:nvPr>
+        </p:nvPicPr>
+        <p:blipFill>
+          <a:blip r:embed="rId2"/>
+          <a:stretch>
+            <a:fillRect/>
+          </a:stretch>
+        </p:blipFill>
+        <p:spPr>
+          <a:xfrm>
+            <a:off x="838200" y="2201571"/>
+            <a:ext cx="10515600" cy="2423004"/>
+          </a:xfrm>
+        </p:spPr>
+      </p:pic>
+      <p:pic>
+        <p:nvPicPr>
+          <p:cNvPr id="4" name="Picture 3">
+            <a:extLst>
+              <a:ext uri="{FF2B5EF4-FFF2-40B4-BE49-F238E27FC236}">
+                <a16:creationId xmlns:a16="http://schemas.microsoft.com/office/drawing/2014/main" id="{053BAB87-CE1E-5044-B619-48EB0E980547}"/>
+              </a:ext>
+            </a:extLst>
+          </p:cNvPr>
+          <p:cNvPicPr>
+            <a:picLocks noChangeAspect="1"/>
+          </p:cNvPicPr>
+          <p:nvPr/>
+        </p:nvPicPr>
+        <p:blipFill>
+          <a:blip r:embed="rId3">
+            <a:extLst>
+              <a:ext uri="{28A0092B-C50C-407E-A947-70E740481C1C}">
+                <a14:useLocalDpi xmlns:a14="http://schemas.microsoft.com/office/drawing/2010/main" val="0"/>
+              </a:ext>
+            </a:extLst>
+          </a:blip>
+          <a:stretch>
+            <a:fillRect/>
+          </a:stretch>
+        </p:blipFill>
+        <p:spPr>
+          <a:xfrm>
+            <a:off x="9801412" y="4624575"/>
+            <a:ext cx="1552388" cy="1552388"/>
+          </a:xfrm>
+          <a:prstGeom prst="rect">
+            <a:avLst/>
+          </a:prstGeom>
+        </p:spPr>
+      </p:pic>
+    </p:spTree>
+    <p:extLst>
+      <p:ext uri="{BB962C8B-B14F-4D97-AF65-F5344CB8AC3E}">
+        <p14:creationId xmlns:p14="http://schemas.microsoft.com/office/powerpoint/2010/main" val="2076901727"/>
+      </p:ext>
+    </p:extLst>
+  </p:cSld>
+  <p:clrMapOvr>
+    <a:masterClrMapping/>
+  </p:clrMapOvr>
+</p:sld>
+</file>
+
+<file path=ppt/slides/slide8.xml><?xml version="1.0" encoding="utf-8"?>
+<p:sld xmlns:a="http://schemas.openxmlformats.org/drawingml/2006/main" xmlns:r="http://schemas.openxmlformats.org/officeDocument/2006/relationships" xmlns:p="http://schemas.openxmlformats.org/presentationml/2006/main">
+  <p:cSld>
+    <p:spTree>
+      <p:nvGrpSpPr>
+        <p:cNvPr id="1" name=""/>
+        <p:cNvGrpSpPr/>
+        <p:nvPr/>
+      </p:nvGrpSpPr>
+      <p:grpSpPr>
+        <a:xfrm>
+          <a:off x="0" y="0"/>
+          <a:ext cx="0" cy="0"/>
+          <a:chOff x="0" y="0"/>
+          <a:chExt cx="0" cy="0"/>
+        </a:xfrm>
+      </p:grpSpPr>
+      <p:sp>
+        <p:nvSpPr>
           <p:cNvPr id="2" name="Title 1"/>
           <p:cNvSpPr>
             <a:spLocks noGrp="1"/>
@@ -4582,7 +4800,16 @@
           <a:p>
             <a:r>
               <a:rPr lang="en-US" dirty="0"/>
-              <a:t>What about a </a:t>
+              <a:t>We can convert a string containing a JSON dictionary into a Python one.</a:t>
+            </a:r>
+          </a:p>
+          <a:p>
+            <a:endParaRPr lang="en-US" dirty="0"/>
+          </a:p>
+          <a:p>
+            <a:r>
+              <a:rPr lang="en-US" dirty="0"/>
+              <a:t>What happens if we try to dump details of a </a:t>
             </a:r>
             <a:r>
               <a:rPr lang="en-US" dirty="0">
@@ -4645,7 +4872,7 @@
 </p:sld>
 </file>
 
-<file path=ppt/slides/slide8.xml><?xml version="1.0" encoding="utf-8"?>
+<file path=ppt/slides/slide9.xml><?xml version="1.0" encoding="utf-8"?>
 <p:sld xmlns:a="http://schemas.openxmlformats.org/drawingml/2006/main" xmlns:r="http://schemas.openxmlformats.org/officeDocument/2006/relationships" xmlns:p="http://schemas.openxmlformats.org/presentationml/2006/main">
   <p:cSld>
     <p:spTree>
@@ -4808,119 +5035,6 @@
     <p:extLst>
       <p:ext uri="{BB962C8B-B14F-4D97-AF65-F5344CB8AC3E}">
         <p14:creationId xmlns:p14="http://schemas.microsoft.com/office/powerpoint/2010/main" val="1964103874"/>
-      </p:ext>
-    </p:extLst>
-  </p:cSld>
-  <p:clrMapOvr>
-    <a:masterClrMapping/>
-  </p:clrMapOvr>
-</p:sld>
-</file>
-
-<file path=ppt/slides/slide9.xml><?xml version="1.0" encoding="utf-8"?>
-<p:sld xmlns:a="http://schemas.openxmlformats.org/drawingml/2006/main" xmlns:r="http://schemas.openxmlformats.org/officeDocument/2006/relationships" xmlns:p="http://schemas.openxmlformats.org/presentationml/2006/main">
-  <p:cSld>
-    <p:spTree>
-      <p:nvGrpSpPr>
-        <p:cNvPr id="1" name=""/>
-        <p:cNvGrpSpPr/>
-        <p:nvPr/>
-      </p:nvGrpSpPr>
-      <p:grpSpPr>
-        <a:xfrm>
-          <a:off x="0" y="0"/>
-          <a:ext cx="0" cy="0"/>
-          <a:chOff x="0" y="0"/>
-          <a:chExt cx="0" cy="0"/>
-        </a:xfrm>
-      </p:grpSpPr>
-      <p:sp>
-        <p:nvSpPr>
-          <p:cNvPr id="2" name="Title 1"/>
-          <p:cNvSpPr>
-            <a:spLocks noGrp="1"/>
-          </p:cNvSpPr>
-          <p:nvPr>
-            <p:ph type="title"/>
-          </p:nvPr>
-        </p:nvSpPr>
-        <p:spPr/>
-        <p:txBody>
-          <a:bodyPr/>
-          <a:lstStyle/>
-          <a:p>
-            <a:pPr algn="ctr"/>
-            <a:r>
-              <a:rPr lang="en-US" dirty="0"/>
-              <a:t>Interacting with files</a:t>
-            </a:r>
-          </a:p>
-        </p:txBody>
-      </p:sp>
-      <p:pic>
-        <p:nvPicPr>
-          <p:cNvPr id="4" name="Picture 3"/>
-          <p:cNvPicPr>
-            <a:picLocks noChangeAspect="1"/>
-          </p:cNvPicPr>
-          <p:nvPr/>
-        </p:nvPicPr>
-        <p:blipFill>
-          <a:blip r:embed="rId2">
-            <a:extLst>
-              <a:ext uri="{28A0092B-C50C-407E-A947-70E740481C1C}">
-                <a14:useLocalDpi xmlns:a14="http://schemas.microsoft.com/office/drawing/2010/main" val="0"/>
-              </a:ext>
-            </a:extLst>
-          </a:blip>
-          <a:stretch>
-            <a:fillRect/>
-          </a:stretch>
-        </p:blipFill>
-        <p:spPr>
-          <a:xfrm>
-            <a:off x="1790700" y="2603500"/>
-            <a:ext cx="8610600" cy="1651000"/>
-          </a:xfrm>
-          <a:prstGeom prst="rect">
-            <a:avLst/>
-          </a:prstGeom>
-        </p:spPr>
-      </p:pic>
-      <p:pic>
-        <p:nvPicPr>
-          <p:cNvPr id="5" name="Picture 4"/>
-          <p:cNvPicPr>
-            <a:picLocks noChangeAspect="1"/>
-          </p:cNvPicPr>
-          <p:nvPr/>
-        </p:nvPicPr>
-        <p:blipFill>
-          <a:blip r:embed="rId3">
-            <a:extLst>
-              <a:ext uri="{28A0092B-C50C-407E-A947-70E740481C1C}">
-                <a14:useLocalDpi xmlns:a14="http://schemas.microsoft.com/office/drawing/2010/main" val="0"/>
-              </a:ext>
-            </a:extLst>
-          </a:blip>
-          <a:stretch>
-            <a:fillRect/>
-          </a:stretch>
-        </p:blipFill>
-        <p:spPr>
-          <a:xfrm>
-            <a:off x="9801412" y="4624575"/>
-            <a:ext cx="1552388" cy="1552388"/>
-          </a:xfrm>
-          <a:prstGeom prst="rect">
-            <a:avLst/>
-          </a:prstGeom>
-        </p:spPr>
-      </p:pic>
-    </p:spTree>
-    <p:extLst>
-      <p:ext uri="{BB962C8B-B14F-4D97-AF65-F5344CB8AC3E}">
-        <p14:creationId xmlns:p14="http://schemas.microsoft.com/office/powerpoint/2010/main" val="1261618328"/>
       </p:ext>
     </p:extLst>
   </p:cSld>

</xml_diff>

<commit_message>
Here's one we made earlier (Happy 60th, Blue Peter!)
</commit_message>
<xml_diff>
--- a/Python Level 2/Lesson 4/Session 4.pptx
+++ b/Python Level 2/Lesson 4/Session 4.pptx
@@ -4824,7 +4824,16 @@
                 <a:ea typeface="Consolas" charset="0"/>
                 <a:cs typeface="Consolas" charset="0"/>
               </a:rPr>
-              <a:t>? Try it now!</a:t>
+              <a:t>? Try it!</a:t>
+            </a:r>
+          </a:p>
+          <a:p>
+            <a:r>
+              <a:rPr lang="en-US" dirty="0">
+                <a:ea typeface="Consolas" charset="0"/>
+                <a:cs typeface="Consolas" charset="0"/>
+              </a:rPr>
+              <a:t>Here’s one I made earlier:</a:t>
             </a:r>
           </a:p>
         </p:txBody>
@@ -4853,6 +4862,42 @@
           <a:xfrm>
             <a:off x="9801412" y="4624575"/>
             <a:ext cx="1552388" cy="1552388"/>
+          </a:xfrm>
+          <a:prstGeom prst="rect">
+            <a:avLst/>
+          </a:prstGeom>
+        </p:spPr>
+      </p:pic>
+      <p:pic>
+        <p:nvPicPr>
+          <p:cNvPr id="6" name="Content Placeholder 11">
+            <a:extLst>
+              <a:ext uri="{FF2B5EF4-FFF2-40B4-BE49-F238E27FC236}">
+                <a16:creationId xmlns:a16="http://schemas.microsoft.com/office/drawing/2014/main" id="{34F316D2-573B-E04E-84CC-C0AED3C2FC6A}"/>
+              </a:ext>
+            </a:extLst>
+          </p:cNvPr>
+          <p:cNvPicPr>
+            <a:picLocks noChangeAspect="1"/>
+          </p:cNvPicPr>
+          <p:nvPr/>
+        </p:nvPicPr>
+        <p:blipFill>
+          <a:blip r:embed="rId3">
+            <a:extLst>
+              <a:ext uri="{28A0092B-C50C-407E-A947-70E740481C1C}">
+                <a14:useLocalDpi xmlns:a14="http://schemas.microsoft.com/office/drawing/2010/main" val="0"/>
+              </a:ext>
+            </a:extLst>
+          </a:blip>
+          <a:stretch>
+            <a:fillRect/>
+          </a:stretch>
+        </p:blipFill>
+        <p:spPr>
+          <a:xfrm>
+            <a:off x="1275699" y="4923847"/>
+            <a:ext cx="8088214" cy="476922"/>
           </a:xfrm>
           <a:prstGeom prst="rect">
             <a:avLst/>

</xml_diff>